<commit_message>
Added CEP chart to repo
</commit_message>
<xml_diff>
--- a/homework3/Homework3.pptx
+++ b/homework3/Homework3.pptx
@@ -13,6 +13,7 @@
     <p:sldId id="260" r:id="rId8"/>
     <p:sldId id="261" r:id="rId9"/>
     <p:sldId id="262" r:id="rId10"/>
+    <p:sldId id="263" r:id="rId11"/>
   </p:sldIdLst>
   <p:sldSz cx="10080625" cy="7559675"/>
   <p:notesSz cx="7772400" cy="10058400"/>
@@ -71,7 +72,7 @@
         <p:spPr>
           <a:xfrm>
             <a:off x="504000" y="301320"/>
-            <a:ext cx="9071280" cy="1262520"/>
+            <a:ext cx="9072000" cy="1262160"/>
           </a:xfrm>
           <a:prstGeom prst="rect">
             <a:avLst/>
@@ -97,8 +98,8 @@
         </p:nvSpPr>
         <p:spPr>
           <a:xfrm>
-            <a:off x="504000" y="1769040"/>
-            <a:ext cx="9071280" cy="2090880"/>
+            <a:off x="504000" y="1768680"/>
+            <a:ext cx="9072000" cy="2090880"/>
           </a:xfrm>
           <a:prstGeom prst="rect">
             <a:avLst/>
@@ -123,8 +124,8 @@
         </p:nvSpPr>
         <p:spPr>
           <a:xfrm>
-            <a:off x="504000" y="4059000"/>
-            <a:ext cx="9071280" cy="2090880"/>
+            <a:off x="504000" y="4058640"/>
+            <a:ext cx="9072000" cy="2090880"/>
           </a:xfrm>
           <a:prstGeom prst="rect">
             <a:avLst/>
@@ -172,7 +173,7 @@
         <p:spPr>
           <a:xfrm>
             <a:off x="504000" y="301320"/>
-            <a:ext cx="9071280" cy="1262520"/>
+            <a:ext cx="9072000" cy="1262160"/>
           </a:xfrm>
           <a:prstGeom prst="rect">
             <a:avLst/>
@@ -198,8 +199,8 @@
         </p:nvSpPr>
         <p:spPr>
           <a:xfrm>
-            <a:off x="504000" y="1769040"/>
-            <a:ext cx="4426560" cy="2090880"/>
+            <a:off x="504000" y="1768680"/>
+            <a:ext cx="4426920" cy="2090880"/>
           </a:xfrm>
           <a:prstGeom prst="rect">
             <a:avLst/>
@@ -224,8 +225,8 @@
         </p:nvSpPr>
         <p:spPr>
           <a:xfrm>
-            <a:off x="5152320" y="1769040"/>
-            <a:ext cx="4426560" cy="2090880"/>
+            <a:off x="5152680" y="1768680"/>
+            <a:ext cx="4426920" cy="2090880"/>
           </a:xfrm>
           <a:prstGeom prst="rect">
             <a:avLst/>
@@ -250,8 +251,8 @@
         </p:nvSpPr>
         <p:spPr>
           <a:xfrm>
-            <a:off x="5152320" y="4059000"/>
-            <a:ext cx="4426560" cy="2090880"/>
+            <a:off x="5152680" y="4058640"/>
+            <a:ext cx="4426920" cy="2090880"/>
           </a:xfrm>
           <a:prstGeom prst="rect">
             <a:avLst/>
@@ -276,8 +277,8 @@
         </p:nvSpPr>
         <p:spPr>
           <a:xfrm>
-            <a:off x="504000" y="4059000"/>
-            <a:ext cx="4426560" cy="2090880"/>
+            <a:off x="504000" y="4058640"/>
+            <a:ext cx="4426920" cy="2090880"/>
           </a:xfrm>
           <a:prstGeom prst="rect">
             <a:avLst/>
@@ -325,7 +326,7 @@
         <p:spPr>
           <a:xfrm>
             <a:off x="504000" y="301320"/>
-            <a:ext cx="9071280" cy="1262520"/>
+            <a:ext cx="9072000" cy="1262160"/>
           </a:xfrm>
           <a:prstGeom prst="rect">
             <a:avLst/>
@@ -351,8 +352,8 @@
         </p:nvSpPr>
         <p:spPr>
           <a:xfrm>
-            <a:off x="504000" y="1769040"/>
-            <a:ext cx="9071280" cy="4384080"/>
+            <a:off x="504000" y="1768680"/>
+            <a:ext cx="9072000" cy="4384080"/>
           </a:xfrm>
           <a:prstGeom prst="rect">
             <a:avLst/>
@@ -377,8 +378,8 @@
         </p:nvSpPr>
         <p:spPr>
           <a:xfrm>
-            <a:off x="504000" y="1769040"/>
-            <a:ext cx="9071280" cy="4384080"/>
+            <a:off x="504000" y="1768680"/>
+            <a:ext cx="9072000" cy="4384080"/>
           </a:xfrm>
           <a:prstGeom prst="rect">
             <a:avLst/>
@@ -405,7 +406,7 @@
         </p:blipFill>
         <p:spPr>
           <a:xfrm>
-            <a:off x="2292120" y="1769040"/>
+            <a:off x="2292480" y="1768680"/>
             <a:ext cx="5494680" cy="4384080"/>
           </a:xfrm>
           <a:prstGeom prst="rect">
@@ -430,7 +431,7 @@
         </p:blipFill>
         <p:spPr>
           <a:xfrm>
-            <a:off x="2292120" y="1769040"/>
+            <a:off x="2292480" y="1768680"/>
             <a:ext cx="5494680" cy="4384080"/>
           </a:xfrm>
           <a:prstGeom prst="rect">
@@ -498,7 +499,7 @@
         <p:spPr>
           <a:xfrm>
             <a:off x="504000" y="301320"/>
-            <a:ext cx="9071280" cy="1262520"/>
+            <a:ext cx="9072000" cy="1262160"/>
           </a:xfrm>
           <a:prstGeom prst="rect">
             <a:avLst/>
@@ -524,8 +525,8 @@
         </p:nvSpPr>
         <p:spPr>
           <a:xfrm>
-            <a:off x="504000" y="1769040"/>
-            <a:ext cx="9071280" cy="4384440"/>
+            <a:off x="504000" y="1768680"/>
+            <a:ext cx="9072000" cy="4384440"/>
           </a:xfrm>
           <a:prstGeom prst="rect">
             <a:avLst/>
@@ -574,7 +575,7 @@
         <p:spPr>
           <a:xfrm>
             <a:off x="504000" y="301320"/>
-            <a:ext cx="9071280" cy="1262520"/>
+            <a:ext cx="9072000" cy="1262160"/>
           </a:xfrm>
           <a:prstGeom prst="rect">
             <a:avLst/>
@@ -600,8 +601,8 @@
         </p:nvSpPr>
         <p:spPr>
           <a:xfrm>
-            <a:off x="504000" y="1769040"/>
-            <a:ext cx="9071280" cy="4384080"/>
+            <a:off x="504000" y="1768680"/>
+            <a:ext cx="9072000" cy="4384080"/>
           </a:xfrm>
           <a:prstGeom prst="rect">
             <a:avLst/>
@@ -649,7 +650,7 @@
         <p:spPr>
           <a:xfrm>
             <a:off x="504000" y="301320"/>
-            <a:ext cx="9071280" cy="1262520"/>
+            <a:ext cx="9072000" cy="1262160"/>
           </a:xfrm>
           <a:prstGeom prst="rect">
             <a:avLst/>
@@ -675,8 +676,8 @@
         </p:nvSpPr>
         <p:spPr>
           <a:xfrm>
-            <a:off x="504000" y="1769040"/>
-            <a:ext cx="4426560" cy="4384080"/>
+            <a:off x="504000" y="1768680"/>
+            <a:ext cx="4426920" cy="4384080"/>
           </a:xfrm>
           <a:prstGeom prst="rect">
             <a:avLst/>
@@ -701,8 +702,8 @@
         </p:nvSpPr>
         <p:spPr>
           <a:xfrm>
-            <a:off x="5152320" y="1769040"/>
-            <a:ext cx="4426560" cy="4384080"/>
+            <a:off x="5152680" y="1768680"/>
+            <a:ext cx="4426920" cy="4384080"/>
           </a:xfrm>
           <a:prstGeom prst="rect">
             <a:avLst/>
@@ -750,7 +751,7 @@
         <p:spPr>
           <a:xfrm>
             <a:off x="504000" y="301320"/>
-            <a:ext cx="9071280" cy="1262520"/>
+            <a:ext cx="9072000" cy="1262160"/>
           </a:xfrm>
           <a:prstGeom prst="rect">
             <a:avLst/>
@@ -799,7 +800,7 @@
         <p:spPr>
           <a:xfrm>
             <a:off x="504000" y="301320"/>
-            <a:ext cx="9071280" cy="5852160"/>
+            <a:ext cx="9072000" cy="5850720"/>
           </a:xfrm>
           <a:prstGeom prst="rect">
             <a:avLst/>
@@ -848,7 +849,7 @@
         <p:spPr>
           <a:xfrm>
             <a:off x="504000" y="301320"/>
-            <a:ext cx="9071280" cy="1262520"/>
+            <a:ext cx="9072000" cy="1262160"/>
           </a:xfrm>
           <a:prstGeom prst="rect">
             <a:avLst/>
@@ -874,8 +875,8 @@
         </p:nvSpPr>
         <p:spPr>
           <a:xfrm>
-            <a:off x="504000" y="1769040"/>
-            <a:ext cx="4426560" cy="2090880"/>
+            <a:off x="504000" y="1768680"/>
+            <a:ext cx="4426920" cy="2090880"/>
           </a:xfrm>
           <a:prstGeom prst="rect">
             <a:avLst/>
@@ -900,8 +901,8 @@
         </p:nvSpPr>
         <p:spPr>
           <a:xfrm>
-            <a:off x="504000" y="4059000"/>
-            <a:ext cx="4426560" cy="2090880"/>
+            <a:off x="504000" y="4058640"/>
+            <a:ext cx="4426920" cy="2090880"/>
           </a:xfrm>
           <a:prstGeom prst="rect">
             <a:avLst/>
@@ -926,8 +927,8 @@
         </p:nvSpPr>
         <p:spPr>
           <a:xfrm>
-            <a:off x="5152320" y="1769040"/>
-            <a:ext cx="4426560" cy="4384080"/>
+            <a:off x="5152680" y="1768680"/>
+            <a:ext cx="4426920" cy="4384080"/>
           </a:xfrm>
           <a:prstGeom prst="rect">
             <a:avLst/>
@@ -975,7 +976,7 @@
         <p:spPr>
           <a:xfrm>
             <a:off x="504000" y="301320"/>
-            <a:ext cx="9071280" cy="1262520"/>
+            <a:ext cx="9072000" cy="1262160"/>
           </a:xfrm>
           <a:prstGeom prst="rect">
             <a:avLst/>
@@ -1001,8 +1002,8 @@
         </p:nvSpPr>
         <p:spPr>
           <a:xfrm>
-            <a:off x="504000" y="1769040"/>
-            <a:ext cx="9071280" cy="4384440"/>
+            <a:off x="504000" y="1768680"/>
+            <a:ext cx="9072000" cy="4384440"/>
           </a:xfrm>
           <a:prstGeom prst="rect">
             <a:avLst/>
@@ -1051,7 +1052,7 @@
         <p:spPr>
           <a:xfrm>
             <a:off x="504000" y="301320"/>
-            <a:ext cx="9071280" cy="1262520"/>
+            <a:ext cx="9072000" cy="1262160"/>
           </a:xfrm>
           <a:prstGeom prst="rect">
             <a:avLst/>
@@ -1077,8 +1078,8 @@
         </p:nvSpPr>
         <p:spPr>
           <a:xfrm>
-            <a:off x="504000" y="1769040"/>
-            <a:ext cx="4426560" cy="4384080"/>
+            <a:off x="504000" y="1768680"/>
+            <a:ext cx="4426920" cy="4384080"/>
           </a:xfrm>
           <a:prstGeom prst="rect">
             <a:avLst/>
@@ -1103,8 +1104,8 @@
         </p:nvSpPr>
         <p:spPr>
           <a:xfrm>
-            <a:off x="5152320" y="1769040"/>
-            <a:ext cx="4426560" cy="2090880"/>
+            <a:off x="5152680" y="1768680"/>
+            <a:ext cx="4426920" cy="2090880"/>
           </a:xfrm>
           <a:prstGeom prst="rect">
             <a:avLst/>
@@ -1129,8 +1130,8 @@
         </p:nvSpPr>
         <p:spPr>
           <a:xfrm>
-            <a:off x="5152320" y="4059000"/>
-            <a:ext cx="4426560" cy="2090880"/>
+            <a:off x="5152680" y="4058640"/>
+            <a:ext cx="4426920" cy="2090880"/>
           </a:xfrm>
           <a:prstGeom prst="rect">
             <a:avLst/>
@@ -1178,7 +1179,7 @@
         <p:spPr>
           <a:xfrm>
             <a:off x="504000" y="301320"/>
-            <a:ext cx="9071280" cy="1262520"/>
+            <a:ext cx="9072000" cy="1262160"/>
           </a:xfrm>
           <a:prstGeom prst="rect">
             <a:avLst/>
@@ -1204,8 +1205,8 @@
         </p:nvSpPr>
         <p:spPr>
           <a:xfrm>
-            <a:off x="504000" y="1769040"/>
-            <a:ext cx="4426560" cy="2090880"/>
+            <a:off x="504000" y="1768680"/>
+            <a:ext cx="4426920" cy="2090880"/>
           </a:xfrm>
           <a:prstGeom prst="rect">
             <a:avLst/>
@@ -1230,8 +1231,8 @@
         </p:nvSpPr>
         <p:spPr>
           <a:xfrm>
-            <a:off x="5152320" y="1769040"/>
-            <a:ext cx="4426560" cy="2090880"/>
+            <a:off x="5152680" y="1768680"/>
+            <a:ext cx="4426920" cy="2090880"/>
           </a:xfrm>
           <a:prstGeom prst="rect">
             <a:avLst/>
@@ -1256,8 +1257,8 @@
         </p:nvSpPr>
         <p:spPr>
           <a:xfrm>
-            <a:off x="504000" y="4059000"/>
-            <a:ext cx="9071280" cy="2090880"/>
+            <a:off x="504000" y="4058640"/>
+            <a:ext cx="9072000" cy="2090880"/>
           </a:xfrm>
           <a:prstGeom prst="rect">
             <a:avLst/>
@@ -1305,7 +1306,7 @@
         <p:spPr>
           <a:xfrm>
             <a:off x="504000" y="301320"/>
-            <a:ext cx="9071280" cy="1262520"/>
+            <a:ext cx="9072000" cy="1262160"/>
           </a:xfrm>
           <a:prstGeom prst="rect">
             <a:avLst/>
@@ -1331,8 +1332,8 @@
         </p:nvSpPr>
         <p:spPr>
           <a:xfrm>
-            <a:off x="504000" y="1769040"/>
-            <a:ext cx="9071280" cy="2090880"/>
+            <a:off x="504000" y="1768680"/>
+            <a:ext cx="9072000" cy="2090880"/>
           </a:xfrm>
           <a:prstGeom prst="rect">
             <a:avLst/>
@@ -1357,8 +1358,8 @@
         </p:nvSpPr>
         <p:spPr>
           <a:xfrm>
-            <a:off x="504000" y="4059000"/>
-            <a:ext cx="9071280" cy="2090880"/>
+            <a:off x="504000" y="4058640"/>
+            <a:ext cx="9072000" cy="2090880"/>
           </a:xfrm>
           <a:prstGeom prst="rect">
             <a:avLst/>
@@ -1406,7 +1407,7 @@
         <p:spPr>
           <a:xfrm>
             <a:off x="504000" y="301320"/>
-            <a:ext cx="9071280" cy="1262520"/>
+            <a:ext cx="9072000" cy="1262160"/>
           </a:xfrm>
           <a:prstGeom prst="rect">
             <a:avLst/>
@@ -1432,8 +1433,8 @@
         </p:nvSpPr>
         <p:spPr>
           <a:xfrm>
-            <a:off x="504000" y="1769040"/>
-            <a:ext cx="4426560" cy="2090880"/>
+            <a:off x="504000" y="1768680"/>
+            <a:ext cx="4426920" cy="2090880"/>
           </a:xfrm>
           <a:prstGeom prst="rect">
             <a:avLst/>
@@ -1458,8 +1459,8 @@
         </p:nvSpPr>
         <p:spPr>
           <a:xfrm>
-            <a:off x="5152320" y="1769040"/>
-            <a:ext cx="4426560" cy="2090880"/>
+            <a:off x="5152680" y="1768680"/>
+            <a:ext cx="4426920" cy="2090880"/>
           </a:xfrm>
           <a:prstGeom prst="rect">
             <a:avLst/>
@@ -1484,8 +1485,8 @@
         </p:nvSpPr>
         <p:spPr>
           <a:xfrm>
-            <a:off x="5152320" y="4059000"/>
-            <a:ext cx="4426560" cy="2090880"/>
+            <a:off x="5152680" y="4058640"/>
+            <a:ext cx="4426920" cy="2090880"/>
           </a:xfrm>
           <a:prstGeom prst="rect">
             <a:avLst/>
@@ -1510,8 +1511,8 @@
         </p:nvSpPr>
         <p:spPr>
           <a:xfrm>
-            <a:off x="504000" y="4059000"/>
-            <a:ext cx="4426560" cy="2090880"/>
+            <a:off x="504000" y="4058640"/>
+            <a:ext cx="4426920" cy="2090880"/>
           </a:xfrm>
           <a:prstGeom prst="rect">
             <a:avLst/>
@@ -1559,7 +1560,7 @@
         <p:spPr>
           <a:xfrm>
             <a:off x="504000" y="301320"/>
-            <a:ext cx="9071280" cy="1262520"/>
+            <a:ext cx="9072000" cy="1262160"/>
           </a:xfrm>
           <a:prstGeom prst="rect">
             <a:avLst/>
@@ -1585,8 +1586,8 @@
         </p:nvSpPr>
         <p:spPr>
           <a:xfrm>
-            <a:off x="504000" y="1769040"/>
-            <a:ext cx="9071280" cy="4384080"/>
+            <a:off x="504000" y="1768680"/>
+            <a:ext cx="9072000" cy="4384080"/>
           </a:xfrm>
           <a:prstGeom prst="rect">
             <a:avLst/>
@@ -1611,8 +1612,8 @@
         </p:nvSpPr>
         <p:spPr>
           <a:xfrm>
-            <a:off x="504000" y="1769040"/>
-            <a:ext cx="9071280" cy="4384080"/>
+            <a:off x="504000" y="1768680"/>
+            <a:ext cx="9072000" cy="4384080"/>
           </a:xfrm>
           <a:prstGeom prst="rect">
             <a:avLst/>
@@ -1639,7 +1640,7 @@
         </p:blipFill>
         <p:spPr>
           <a:xfrm>
-            <a:off x="2292120" y="1769040"/>
+            <a:off x="2292480" y="1768680"/>
             <a:ext cx="5494680" cy="4384080"/>
           </a:xfrm>
           <a:prstGeom prst="rect">
@@ -1664,7 +1665,7 @@
         </p:blipFill>
         <p:spPr>
           <a:xfrm>
-            <a:off x="2292120" y="1769040"/>
+            <a:off x="2292480" y="1768680"/>
             <a:ext cx="5494680" cy="4384080"/>
           </a:xfrm>
           <a:prstGeom prst="rect">
@@ -1710,7 +1711,7 @@
         <p:spPr>
           <a:xfrm>
             <a:off x="504000" y="301320"/>
-            <a:ext cx="9071280" cy="1262520"/>
+            <a:ext cx="9072000" cy="1262160"/>
           </a:xfrm>
           <a:prstGeom prst="rect">
             <a:avLst/>
@@ -1736,8 +1737,8 @@
         </p:nvSpPr>
         <p:spPr>
           <a:xfrm>
-            <a:off x="504000" y="1769040"/>
-            <a:ext cx="9071280" cy="4384080"/>
+            <a:off x="504000" y="1768680"/>
+            <a:ext cx="9072000" cy="4384080"/>
           </a:xfrm>
           <a:prstGeom prst="rect">
             <a:avLst/>
@@ -1785,7 +1786,7 @@
         <p:spPr>
           <a:xfrm>
             <a:off x="504000" y="301320"/>
-            <a:ext cx="9071280" cy="1262520"/>
+            <a:ext cx="9072000" cy="1262160"/>
           </a:xfrm>
           <a:prstGeom prst="rect">
             <a:avLst/>
@@ -1811,8 +1812,8 @@
         </p:nvSpPr>
         <p:spPr>
           <a:xfrm>
-            <a:off x="504000" y="1769040"/>
-            <a:ext cx="4426560" cy="4384080"/>
+            <a:off x="504000" y="1768680"/>
+            <a:ext cx="4426920" cy="4384080"/>
           </a:xfrm>
           <a:prstGeom prst="rect">
             <a:avLst/>
@@ -1837,8 +1838,8 @@
         </p:nvSpPr>
         <p:spPr>
           <a:xfrm>
-            <a:off x="5152320" y="1769040"/>
-            <a:ext cx="4426560" cy="4384080"/>
+            <a:off x="5152680" y="1768680"/>
+            <a:ext cx="4426920" cy="4384080"/>
           </a:xfrm>
           <a:prstGeom prst="rect">
             <a:avLst/>
@@ -1886,7 +1887,7 @@
         <p:spPr>
           <a:xfrm>
             <a:off x="504000" y="301320"/>
-            <a:ext cx="9071280" cy="1262520"/>
+            <a:ext cx="9072000" cy="1262160"/>
           </a:xfrm>
           <a:prstGeom prst="rect">
             <a:avLst/>
@@ -1935,7 +1936,7 @@
         <p:spPr>
           <a:xfrm>
             <a:off x="504000" y="301320"/>
-            <a:ext cx="9071280" cy="5852160"/>
+            <a:ext cx="9072000" cy="5850720"/>
           </a:xfrm>
           <a:prstGeom prst="rect">
             <a:avLst/>
@@ -1984,7 +1985,7 @@
         <p:spPr>
           <a:xfrm>
             <a:off x="504000" y="301320"/>
-            <a:ext cx="9071280" cy="1262520"/>
+            <a:ext cx="9072000" cy="1262160"/>
           </a:xfrm>
           <a:prstGeom prst="rect">
             <a:avLst/>
@@ -2010,8 +2011,8 @@
         </p:nvSpPr>
         <p:spPr>
           <a:xfrm>
-            <a:off x="504000" y="1769040"/>
-            <a:ext cx="4426560" cy="2090880"/>
+            <a:off x="504000" y="1768680"/>
+            <a:ext cx="4426920" cy="2090880"/>
           </a:xfrm>
           <a:prstGeom prst="rect">
             <a:avLst/>
@@ -2036,8 +2037,8 @@
         </p:nvSpPr>
         <p:spPr>
           <a:xfrm>
-            <a:off x="504000" y="4059000"/>
-            <a:ext cx="4426560" cy="2090880"/>
+            <a:off x="504000" y="4058640"/>
+            <a:ext cx="4426920" cy="2090880"/>
           </a:xfrm>
           <a:prstGeom prst="rect">
             <a:avLst/>
@@ -2062,8 +2063,8 @@
         </p:nvSpPr>
         <p:spPr>
           <a:xfrm>
-            <a:off x="5152320" y="1769040"/>
-            <a:ext cx="4426560" cy="4384080"/>
+            <a:off x="5152680" y="1768680"/>
+            <a:ext cx="4426920" cy="4384080"/>
           </a:xfrm>
           <a:prstGeom prst="rect">
             <a:avLst/>
@@ -2111,7 +2112,7 @@
         <p:spPr>
           <a:xfrm>
             <a:off x="504000" y="301320"/>
-            <a:ext cx="9071280" cy="1262520"/>
+            <a:ext cx="9072000" cy="1262160"/>
           </a:xfrm>
           <a:prstGeom prst="rect">
             <a:avLst/>
@@ -2137,8 +2138,8 @@
         </p:nvSpPr>
         <p:spPr>
           <a:xfrm>
-            <a:off x="504000" y="1769040"/>
-            <a:ext cx="4426560" cy="4384080"/>
+            <a:off x="504000" y="1768680"/>
+            <a:ext cx="4426920" cy="4384080"/>
           </a:xfrm>
           <a:prstGeom prst="rect">
             <a:avLst/>
@@ -2163,8 +2164,8 @@
         </p:nvSpPr>
         <p:spPr>
           <a:xfrm>
-            <a:off x="5152320" y="1769040"/>
-            <a:ext cx="4426560" cy="2090880"/>
+            <a:off x="5152680" y="1768680"/>
+            <a:ext cx="4426920" cy="2090880"/>
           </a:xfrm>
           <a:prstGeom prst="rect">
             <a:avLst/>
@@ -2189,8 +2190,8 @@
         </p:nvSpPr>
         <p:spPr>
           <a:xfrm>
-            <a:off x="5152320" y="4059000"/>
-            <a:ext cx="4426560" cy="2090880"/>
+            <a:off x="5152680" y="4058640"/>
+            <a:ext cx="4426920" cy="2090880"/>
           </a:xfrm>
           <a:prstGeom prst="rect">
             <a:avLst/>
@@ -2238,7 +2239,7 @@
         <p:spPr>
           <a:xfrm>
             <a:off x="504000" y="301320"/>
-            <a:ext cx="9071280" cy="1262520"/>
+            <a:ext cx="9072000" cy="1262160"/>
           </a:xfrm>
           <a:prstGeom prst="rect">
             <a:avLst/>
@@ -2264,8 +2265,8 @@
         </p:nvSpPr>
         <p:spPr>
           <a:xfrm>
-            <a:off x="504000" y="1769040"/>
-            <a:ext cx="4426560" cy="2090880"/>
+            <a:off x="504000" y="1768680"/>
+            <a:ext cx="4426920" cy="2090880"/>
           </a:xfrm>
           <a:prstGeom prst="rect">
             <a:avLst/>
@@ -2290,8 +2291,8 @@
         </p:nvSpPr>
         <p:spPr>
           <a:xfrm>
-            <a:off x="5152320" y="1769040"/>
-            <a:ext cx="4426560" cy="2090880"/>
+            <a:off x="5152680" y="1768680"/>
+            <a:ext cx="4426920" cy="2090880"/>
           </a:xfrm>
           <a:prstGeom prst="rect">
             <a:avLst/>
@@ -2316,8 +2317,8 @@
         </p:nvSpPr>
         <p:spPr>
           <a:xfrm>
-            <a:off x="504000" y="4059000"/>
-            <a:ext cx="9071280" cy="2090880"/>
+            <a:off x="504000" y="4058640"/>
+            <a:ext cx="9072000" cy="2090880"/>
           </a:xfrm>
           <a:prstGeom prst="rect">
             <a:avLst/>
@@ -2365,7 +2366,7 @@
         <p:spPr>
           <a:xfrm>
             <a:off x="504000" y="301320"/>
-            <a:ext cx="9071280" cy="1262160"/>
+            <a:ext cx="9070920" cy="1262160"/>
           </a:xfrm>
           <a:prstGeom prst="rect">
             <a:avLst/>
@@ -2396,8 +2397,8 @@
         </p:nvSpPr>
         <p:spPr>
           <a:xfrm>
-            <a:off x="504000" y="1768680"/>
-            <a:ext cx="9072000" cy="4384080"/>
+            <a:off x="504000" y="1769040"/>
+            <a:ext cx="9070920" cy="4383720"/>
           </a:xfrm>
           <a:prstGeom prst="rect">
             <a:avLst/>
@@ -2412,7 +2413,7 @@
               <a:buChar char=""/>
             </a:pPr>
             <a:r>
-              <a:rPr lang="en-US" sz="3200">
+              <a:rPr lang="en-US">
                 <a:latin typeface="Arial"/>
               </a:rPr>
               <a:t>Click to edit the outline text format</a:t>
@@ -2426,7 +2427,7 @@
               <a:buChar char=""/>
             </a:pPr>
             <a:r>
-              <a:rPr lang="en-US" sz="2800">
+              <a:rPr lang="en-US">
                 <a:latin typeface="Arial"/>
               </a:rPr>
               <a:t>Second Outline Level</a:t>
@@ -2440,7 +2441,7 @@
               <a:buChar char=""/>
             </a:pPr>
             <a:r>
-              <a:rPr lang="en-US" sz="2400">
+              <a:rPr lang="en-US">
                 <a:latin typeface="Arial"/>
               </a:rPr>
               <a:t>Third Outline Level</a:t>
@@ -2454,7 +2455,7 @@
               <a:buChar char=""/>
             </a:pPr>
             <a:r>
-              <a:rPr lang="en-US" sz="2000">
+              <a:rPr lang="en-US">
                 <a:latin typeface="Arial"/>
               </a:rPr>
               <a:t>Fourth Outline Level</a:t>
@@ -2468,7 +2469,7 @@
               <a:buChar char=""/>
             </a:pPr>
             <a:r>
-              <a:rPr lang="en-US" sz="2000">
+              <a:rPr lang="en-US">
                 <a:latin typeface="Arial"/>
               </a:rPr>
               <a:t>Fifth Outline Level</a:t>
@@ -2482,7 +2483,7 @@
               <a:buChar char=""/>
             </a:pPr>
             <a:r>
-              <a:rPr lang="en-US" sz="2000">
+              <a:rPr lang="en-US">
                 <a:latin typeface="Arial"/>
               </a:rPr>
               <a:t>Sixth Outline Level</a:t>
@@ -2496,7 +2497,7 @@
               <a:buChar char=""/>
             </a:pPr>
             <a:r>
-              <a:rPr lang="en-US" sz="2000">
+              <a:rPr lang="en-US">
                 <a:latin typeface="Arial"/>
               </a:rPr>
               <a:t>Seventh Outline Level</a:t>
@@ -2555,7 +2556,7 @@
         <p:spPr>
           <a:xfrm>
             <a:off x="504000" y="301320"/>
-            <a:ext cx="9071280" cy="1262160"/>
+            <a:ext cx="9072000" cy="1261800"/>
           </a:xfrm>
           <a:prstGeom prst="rect">
             <a:avLst/>
@@ -2564,8 +2565,9 @@
         <p:txBody>
           <a:bodyPr lIns="0" rIns="0" tIns="0" bIns="0" anchor="ctr"/>
           <a:p>
+            <a:pPr algn="ctr"/>
             <a:r>
-              <a:rPr lang="en-US">
+              <a:rPr lang="en-US" sz="4400">
                 <a:latin typeface="Arial"/>
               </a:rPr>
               <a:t>Click to edit the title text format</a:t>
@@ -2586,8 +2588,8 @@
         </p:nvSpPr>
         <p:spPr>
           <a:xfrm>
-            <a:off x="504000" y="1769040"/>
-            <a:ext cx="9071280" cy="4384080"/>
+            <a:off x="504000" y="1768680"/>
+            <a:ext cx="9072000" cy="4384080"/>
           </a:xfrm>
           <a:prstGeom prst="rect">
             <a:avLst/>
@@ -2602,7 +2604,7 @@
               <a:buChar char=""/>
             </a:pPr>
             <a:r>
-              <a:rPr lang="en-US">
+              <a:rPr lang="en-US" sz="3200">
                 <a:latin typeface="Arial"/>
               </a:rPr>
               <a:t>Click to edit the outline text format</a:t>
@@ -2616,7 +2618,7 @@
               <a:buChar char=""/>
             </a:pPr>
             <a:r>
-              <a:rPr lang="en-US">
+              <a:rPr lang="en-US" sz="2800">
                 <a:latin typeface="Arial"/>
               </a:rPr>
               <a:t>Second Outline Level</a:t>
@@ -2630,7 +2632,7 @@
               <a:buChar char=""/>
             </a:pPr>
             <a:r>
-              <a:rPr lang="en-US">
+              <a:rPr lang="en-US" sz="2400">
                 <a:latin typeface="Arial"/>
               </a:rPr>
               <a:t>Third Outline Level</a:t>
@@ -2644,7 +2646,7 @@
               <a:buChar char=""/>
             </a:pPr>
             <a:r>
-              <a:rPr lang="en-US">
+              <a:rPr lang="en-US" sz="2000">
                 <a:latin typeface="Arial"/>
               </a:rPr>
               <a:t>Fourth Outline Level</a:t>
@@ -2658,7 +2660,7 @@
               <a:buChar char=""/>
             </a:pPr>
             <a:r>
-              <a:rPr lang="en-US">
+              <a:rPr lang="en-US" sz="2000">
                 <a:latin typeface="Arial"/>
               </a:rPr>
               <a:t>Fifth Outline Level</a:t>
@@ -2672,7 +2674,7 @@
               <a:buChar char=""/>
             </a:pPr>
             <a:r>
-              <a:rPr lang="en-US">
+              <a:rPr lang="en-US" sz="2000">
                 <a:latin typeface="Arial"/>
               </a:rPr>
               <a:t>Sixth Outline Level</a:t>
@@ -2686,7 +2688,7 @@
               <a:buChar char=""/>
             </a:pPr>
             <a:r>
-              <a:rPr lang="en-US">
+              <a:rPr lang="en-US" sz="2000">
                 <a:latin typeface="Arial"/>
               </a:rPr>
               <a:t>Seventh Outline Level</a:t>
@@ -2741,7 +2743,7 @@
         <p:spPr>
           <a:xfrm>
             <a:off x="504000" y="301320"/>
-            <a:ext cx="9071280" cy="1261800"/>
+            <a:ext cx="9070920" cy="1261440"/>
           </a:xfrm>
           <a:prstGeom prst="rect">
             <a:avLst/>
@@ -2787,7 +2789,7 @@
         <p:spPr>
           <a:xfrm>
             <a:off x="504000" y="1769040"/>
-            <a:ext cx="9071280" cy="4384080"/>
+            <a:ext cx="9070920" cy="4383720"/>
           </a:xfrm>
           <a:prstGeom prst="rect">
             <a:avLst/>
@@ -2887,7 +2889,7 @@
         <p:spPr>
           <a:xfrm>
             <a:off x="504000" y="301320"/>
-            <a:ext cx="9071280" cy="1261800"/>
+            <a:ext cx="9070920" cy="1261440"/>
           </a:xfrm>
           <a:prstGeom prst="rect">
             <a:avLst/>
@@ -2924,7 +2926,7 @@
         <p:spPr>
           <a:xfrm>
             <a:off x="504000" y="1769040"/>
-            <a:ext cx="9071280" cy="4384080"/>
+            <a:ext cx="9070920" cy="4383720"/>
           </a:xfrm>
           <a:prstGeom prst="rect">
             <a:avLst/>
@@ -3132,7 +3134,7 @@
         <p:spPr>
           <a:xfrm>
             <a:off x="504000" y="301320"/>
-            <a:ext cx="9071280" cy="1261800"/>
+            <a:ext cx="9070920" cy="1261440"/>
           </a:xfrm>
           <a:prstGeom prst="rect">
             <a:avLst/>
@@ -3175,7 +3177,7 @@
         <p:spPr>
           <a:xfrm>
             <a:off x="2375640" y="1782000"/>
-            <a:ext cx="5333400" cy="3999960"/>
+            <a:ext cx="5333040" cy="3999600"/>
           </a:xfrm>
           <a:prstGeom prst="rect">
             <a:avLst/>
@@ -3243,7 +3245,7 @@
         <p:spPr>
           <a:xfrm>
             <a:off x="504000" y="301320"/>
-            <a:ext cx="9071280" cy="1261800"/>
+            <a:ext cx="9070920" cy="1261440"/>
           </a:xfrm>
           <a:prstGeom prst="rect">
             <a:avLst/>
@@ -3280,7 +3282,7 @@
         <p:spPr>
           <a:xfrm>
             <a:off x="504000" y="1769040"/>
-            <a:ext cx="9071280" cy="4384080"/>
+            <a:ext cx="9070920" cy="4383720"/>
           </a:xfrm>
           <a:prstGeom prst="rect">
             <a:avLst/>
@@ -3369,7 +3371,7 @@
         <p:spPr>
           <a:xfrm>
             <a:off x="504000" y="301320"/>
-            <a:ext cx="9071280" cy="1261800"/>
+            <a:ext cx="9070920" cy="1261440"/>
           </a:xfrm>
           <a:prstGeom prst="rect">
             <a:avLst/>
@@ -3395,7 +3397,7 @@
         <p:spPr>
           <a:xfrm>
             <a:off x="2116800" y="1768680"/>
-            <a:ext cx="5845320" cy="4383720"/>
+            <a:ext cx="5844960" cy="4383360"/>
           </a:xfrm>
           <a:prstGeom prst="rect">
             <a:avLst/>
@@ -3463,7 +3465,7 @@
         <p:spPr>
           <a:xfrm>
             <a:off x="504000" y="301320"/>
-            <a:ext cx="9071280" cy="1261800"/>
+            <a:ext cx="9070920" cy="1261440"/>
           </a:xfrm>
           <a:prstGeom prst="rect">
             <a:avLst/>
@@ -3500,7 +3502,7 @@
         <p:spPr>
           <a:xfrm>
             <a:off x="504000" y="1769040"/>
-            <a:ext cx="9071280" cy="4384080"/>
+            <a:ext cx="9070920" cy="4383720"/>
           </a:xfrm>
           <a:prstGeom prst="rect">
             <a:avLst/>
@@ -3580,16 +3582,63 @@
           <a:chExt cx="0" cy="0"/>
         </a:xfrm>
       </p:grpSpPr>
-      <p:sp>
-        <p:nvSpPr>
-          <p:cNvPr id="84" name="CustomShape 1"/>
+      <p:pic>
+        <p:nvPicPr>
+          <p:cNvPr id="84" name="" descr=""/>
+          <p:cNvPicPr/>
+          <p:nvPr/>
+        </p:nvPicPr>
+        <p:blipFill>
+          <a:blip r:embed="rId1"/>
+          <a:stretch>
+            <a:fillRect/>
+          </a:stretch>
+        </p:blipFill>
+        <p:spPr>
+          <a:xfrm>
+            <a:off x="2194560" y="937440"/>
+            <a:ext cx="5333760" cy="4000320"/>
+          </a:xfrm>
+          <a:prstGeom prst="rect">
+            <a:avLst/>
+          </a:prstGeom>
+          <a:ln>
+            <a:noFill/>
+          </a:ln>
+        </p:spPr>
+      </p:pic>
+    </p:spTree>
+  </p:cSld>
+</p:sld>
+</file>
+
+<file path=ppt/slides/slide8.xml><?xml version="1.0" encoding="utf-8"?>
+<p:sld xmlns:a="http://schemas.openxmlformats.org/drawingml/2006/main" xmlns:p="http://schemas.openxmlformats.org/presentationml/2006/main" xmlns:r="http://schemas.openxmlformats.org/officeDocument/2006/relationships">
+  <p:cSld>
+    <p:spTree>
+      <p:nvGrpSpPr>
+        <p:cNvPr id="1" name=""/>
+        <p:cNvGrpSpPr/>
+        <p:nvPr/>
+      </p:nvGrpSpPr>
+      <p:grpSpPr>
+        <a:xfrm>
+          <a:off x="0" y="0"/>
+          <a:ext cx="0" cy="0"/>
+          <a:chOff x="0" y="0"/>
+          <a:chExt cx="0" cy="0"/>
+        </a:xfrm>
+      </p:grpSpPr>
+      <p:sp>
+        <p:nvSpPr>
+          <p:cNvPr id="85" name="CustomShape 1"/>
           <p:cNvSpPr/>
           <p:nvPr/>
         </p:nvSpPr>
         <p:spPr>
           <a:xfrm>
             <a:off x="504000" y="301320"/>
-            <a:ext cx="9071280" cy="1261800"/>
+            <a:ext cx="9070920" cy="1261440"/>
           </a:xfrm>
           <a:prstGeom prst="rect">
             <a:avLst/>
@@ -3619,14 +3668,14 @@
       </p:sp>
       <p:sp>
         <p:nvSpPr>
-          <p:cNvPr id="85" name="CustomShape 2"/>
+          <p:cNvPr id="86" name="CustomShape 2"/>
           <p:cNvSpPr/>
           <p:nvPr/>
         </p:nvSpPr>
         <p:spPr>
           <a:xfrm>
             <a:off x="504000" y="1769040"/>
-            <a:ext cx="9071280" cy="4384080"/>
+            <a:ext cx="9070920" cy="4383720"/>
           </a:xfrm>
           <a:prstGeom prst="rect">
             <a:avLst/>
@@ -3648,10 +3697,10 @@
               <a:buChar char="l"/>
             </a:pPr>
             <a:r>
-              <a:rPr lang="en-US" sz="3200">
+              <a:rPr lang="en-US" sz="2000">
                 <a:latin typeface="Arial"/>
               </a:rPr>
-              <a:t>Overall, the GPS positioning was relatively accurate. GPS should not be used for ultra precise location services but regardless it gives a good estimate on the location. Furthermore, the noise distribution seems to be relatively even because in both cases it seemed to be coming back to the correct location. For example, while the gps was moving, it would serve left and right of the trajectory but would never veer to far of course. After veering one direction it seemed to veer the other direction which would average out to the correct line. For us the biggest factors were the scattering of the signals from the building which would be  a non-guassian distribution. Also, the position of the Satellites at that time could affect the  gps data. It depends  on how spread out the Satellites are  </a:t>
+              <a:t>Overall, the GPS positioning was relatively accurate. We were inside the CEP 50% error range. GPS should not be used for ultra precise location services but regardless it gives a good estimate on the location. Furthermore, the noise distribution seems to be relatively even because in both cases it seemed to be coming back to the correct location. For example, while the gps was moving, it would serve left and right of the trajectory but would never veer to far of course. After veering one direction it seemed to veer the other direction which would average out to the correct line. For us the biggest factors were the scattering of the signals from the building which would be  a non-guassian distribution. Also, the position of the Satellites at that time could affect the  gps data. It depends  on how spread out the Satellites are.  </a:t>
             </a:r>
             <a:endParaRPr/>
           </a:p>

</xml_diff>

<commit_message>
Adding parameter setting node to homework4
</commit_message>
<xml_diff>
--- a/homework3/Homework3.pptx
+++ b/homework3/Homework3.pptx
@@ -3609,6 +3609,33 @@
       </p:pic>
     </p:spTree>
   </p:cSld>
+  <p:timing>
+    <p:tnLst>
+      <p:par>
+        <p:cTn id="13" dur="indefinite" restart="never" nodeType="tmRoot">
+          <p:childTnLst>
+            <p:seq>
+              <p:cTn id="14" nodeType="mainSeq"/>
+              <p:prevCondLst>
+                <p:cond delay="0" evt="onPrev">
+                  <p:tgtEl>
+                    <p:sldTgt/>
+                  </p:tgtEl>
+                </p:cond>
+              </p:prevCondLst>
+              <p:nextCondLst>
+                <p:cond delay="0" evt="onNext">
+                  <p:tgtEl>
+                    <p:sldTgt/>
+                  </p:tgtEl>
+                </p:cond>
+              </p:nextCondLst>
+            </p:seq>
+          </p:childTnLst>
+        </p:cTn>
+      </p:par>
+    </p:tnLst>
+  </p:timing>
 </p:sld>
 </file>
 
@@ -3711,10 +3738,10 @@
   <p:timing>
     <p:tnLst>
       <p:par>
-        <p:cTn id="13" dur="indefinite" restart="never" nodeType="tmRoot">
+        <p:cTn id="15" dur="indefinite" restart="never" nodeType="tmRoot">
           <p:childTnLst>
             <p:seq>
-              <p:cTn id="14" nodeType="mainSeq"/>
+              <p:cTn id="16" nodeType="mainSeq"/>
               <p:prevCondLst>
                 <p:cond delay="0" evt="onPrev">
                   <p:tgtEl>

</xml_diff>